<commit_message>
Add step buildern pattern
</commit_message>
<xml_diff>
--- a/Java Design Patterns.pptx
+++ b/Java Design Patterns.pptx
@@ -17,6 +17,7 @@
     <p:sldId id="265" r:id="rId11"/>
     <p:sldId id="266" r:id="rId12"/>
     <p:sldId id="267" r:id="rId13"/>
+    <p:sldId id="268" r:id="rId14"/>
   </p:sldIdLst>
   <p:sldSz cx="12192000" cy="6858000"/>
   <p:notesSz cx="6858000" cy="9144000"/>
@@ -868,7 +869,7 @@
           <a:p>
             <a:fld id="{0F345699-BDC6-4181-BA05-9C9BBD28C789}" type="datetimeFigureOut">
               <a:rPr lang="en-US" smtClean="0"/>
-              <a:t>10/24/2019</a:t>
+              <a:t>10/25/2019</a:t>
             </a:fld>
             <a:endParaRPr lang="en-US"/>
           </a:p>
@@ -1119,7 +1120,7 @@
           <a:p>
             <a:fld id="{0F345699-BDC6-4181-BA05-9C9BBD28C789}" type="datetimeFigureOut">
               <a:rPr lang="en-US" smtClean="0"/>
-              <a:t>10/24/2019</a:t>
+              <a:t>10/25/2019</a:t>
             </a:fld>
             <a:endParaRPr lang="en-US"/>
           </a:p>
@@ -1433,7 +1434,7 @@
           <a:p>
             <a:fld id="{0F345699-BDC6-4181-BA05-9C9BBD28C789}" type="datetimeFigureOut">
               <a:rPr lang="en-US" smtClean="0"/>
-              <a:t>10/24/2019</a:t>
+              <a:t>10/25/2019</a:t>
             </a:fld>
             <a:endParaRPr lang="en-US"/>
           </a:p>
@@ -1766,7 +1767,7 @@
           <a:p>
             <a:fld id="{0F345699-BDC6-4181-BA05-9C9BBD28C789}" type="datetimeFigureOut">
               <a:rPr lang="en-US" smtClean="0"/>
-              <a:t>10/24/2019</a:t>
+              <a:t>10/25/2019</a:t>
             </a:fld>
             <a:endParaRPr lang="en-US"/>
           </a:p>
@@ -2080,7 +2081,7 @@
           <a:p>
             <a:fld id="{0F345699-BDC6-4181-BA05-9C9BBD28C789}" type="datetimeFigureOut">
               <a:rPr lang="en-US" smtClean="0"/>
-              <a:t>10/24/2019</a:t>
+              <a:t>10/25/2019</a:t>
             </a:fld>
             <a:endParaRPr lang="en-US"/>
           </a:p>
@@ -2473,7 +2474,7 @@
           <a:p>
             <a:fld id="{0F345699-BDC6-4181-BA05-9C9BBD28C789}" type="datetimeFigureOut">
               <a:rPr lang="en-US" smtClean="0"/>
-              <a:t>10/24/2019</a:t>
+              <a:t>10/25/2019</a:t>
             </a:fld>
             <a:endParaRPr lang="en-US"/>
           </a:p>
@@ -2643,7 +2644,7 @@
           <a:p>
             <a:fld id="{0F345699-BDC6-4181-BA05-9C9BBD28C789}" type="datetimeFigureOut">
               <a:rPr lang="en-US" smtClean="0"/>
-              <a:t>10/24/2019</a:t>
+              <a:t>10/25/2019</a:t>
             </a:fld>
             <a:endParaRPr lang="en-US"/>
           </a:p>
@@ -2823,7 +2824,7 @@
           <a:p>
             <a:fld id="{0F345699-BDC6-4181-BA05-9C9BBD28C789}" type="datetimeFigureOut">
               <a:rPr lang="en-US" smtClean="0"/>
-              <a:t>10/24/2019</a:t>
+              <a:t>10/25/2019</a:t>
             </a:fld>
             <a:endParaRPr lang="en-US"/>
           </a:p>
@@ -2993,7 +2994,7 @@
           <a:p>
             <a:fld id="{0F345699-BDC6-4181-BA05-9C9BBD28C789}" type="datetimeFigureOut">
               <a:rPr lang="en-US" smtClean="0"/>
-              <a:t>10/24/2019</a:t>
+              <a:t>10/25/2019</a:t>
             </a:fld>
             <a:endParaRPr lang="en-US"/>
           </a:p>
@@ -3240,7 +3241,7 @@
           <a:p>
             <a:fld id="{0F345699-BDC6-4181-BA05-9C9BBD28C789}" type="datetimeFigureOut">
               <a:rPr lang="en-US" smtClean="0"/>
-              <a:t>10/24/2019</a:t>
+              <a:t>10/25/2019</a:t>
             </a:fld>
             <a:endParaRPr lang="en-US"/>
           </a:p>
@@ -3472,7 +3473,7 @@
           <a:p>
             <a:fld id="{0F345699-BDC6-4181-BA05-9C9BBD28C789}" type="datetimeFigureOut">
               <a:rPr lang="en-US" smtClean="0"/>
-              <a:t>10/24/2019</a:t>
+              <a:t>10/25/2019</a:t>
             </a:fld>
             <a:endParaRPr lang="en-US"/>
           </a:p>
@@ -3846,7 +3847,7 @@
           <a:p>
             <a:fld id="{0F345699-BDC6-4181-BA05-9C9BBD28C789}" type="datetimeFigureOut">
               <a:rPr lang="en-US" smtClean="0"/>
-              <a:t>10/24/2019</a:t>
+              <a:t>10/25/2019</a:t>
             </a:fld>
             <a:endParaRPr lang="en-US"/>
           </a:p>
@@ -3969,7 +3970,7 @@
           <a:p>
             <a:fld id="{0F345699-BDC6-4181-BA05-9C9BBD28C789}" type="datetimeFigureOut">
               <a:rPr lang="en-US" smtClean="0"/>
-              <a:t>10/24/2019</a:t>
+              <a:t>10/25/2019</a:t>
             </a:fld>
             <a:endParaRPr lang="en-US"/>
           </a:p>
@@ -4064,7 +4065,7 @@
           <a:p>
             <a:fld id="{0F345699-BDC6-4181-BA05-9C9BBD28C789}" type="datetimeFigureOut">
               <a:rPr lang="en-US" smtClean="0"/>
-              <a:t>10/24/2019</a:t>
+              <a:t>10/25/2019</a:t>
             </a:fld>
             <a:endParaRPr lang="en-US"/>
           </a:p>
@@ -4319,7 +4320,7 @@
           <a:p>
             <a:fld id="{0F345699-BDC6-4181-BA05-9C9BBD28C789}" type="datetimeFigureOut">
               <a:rPr lang="en-US" smtClean="0"/>
-              <a:t>10/24/2019</a:t>
+              <a:t>10/25/2019</a:t>
             </a:fld>
             <a:endParaRPr lang="en-US"/>
           </a:p>
@@ -4624,7 +4625,7 @@
           <a:p>
             <a:fld id="{0F345699-BDC6-4181-BA05-9C9BBD28C789}" type="datetimeFigureOut">
               <a:rPr lang="en-US" smtClean="0"/>
-              <a:t>10/24/2019</a:t>
+              <a:t>10/25/2019</a:t>
             </a:fld>
             <a:endParaRPr lang="en-US"/>
           </a:p>
@@ -5326,7 +5327,7 @@
           <a:p>
             <a:fld id="{0F345699-BDC6-4181-BA05-9C9BBD28C789}" type="datetimeFigureOut">
               <a:rPr lang="en-US" smtClean="0"/>
-              <a:t>10/24/2019</a:t>
+              <a:t>10/25/2019</a:t>
             </a:fld>
             <a:endParaRPr lang="en-US"/>
           </a:p>
@@ -5950,11 +5951,7 @@
           <a:p>
             <a:r>
               <a:rPr lang="en-US" sz="2800" dirty="0" smtClean="0"/>
-              <a:t>Singleton design </a:t>
-            </a:r>
-            <a:r>
-              <a:rPr lang="en-US" sz="2800" dirty="0" smtClean="0"/>
-              <a:t>pattern</a:t>
+              <a:t>Singleton design pattern</a:t>
             </a:r>
             <a:endParaRPr lang="en-US" sz="2800" dirty="0"/>
           </a:p>
@@ -6060,11 +6057,7 @@
           <a:p>
             <a:r>
               <a:rPr lang="en-US" sz="2800" dirty="0" smtClean="0"/>
-              <a:t>Singleton design </a:t>
-            </a:r>
-            <a:r>
-              <a:rPr lang="en-US" sz="2800" dirty="0" smtClean="0"/>
-              <a:t>pattern</a:t>
+              <a:t>Singleton design pattern</a:t>
             </a:r>
             <a:endParaRPr lang="en-US" sz="2800" dirty="0"/>
           </a:p>
@@ -6174,11 +6167,7 @@
           <a:p>
             <a:r>
               <a:rPr lang="en-US" sz="2800" dirty="0" smtClean="0"/>
-              <a:t>Builder design </a:t>
-            </a:r>
-            <a:r>
-              <a:rPr lang="en-US" sz="2800" dirty="0" smtClean="0"/>
-              <a:t>pattern</a:t>
+              <a:t>Builder design pattern</a:t>
             </a:r>
             <a:endParaRPr lang="en-US" sz="2800" dirty="0"/>
           </a:p>
@@ -6226,6 +6215,116 @@
     <p:extLst>
       <p:ext uri="{BB962C8B-B14F-4D97-AF65-F5344CB8AC3E}">
         <p14:creationId xmlns:p14="http://schemas.microsoft.com/office/powerpoint/2010/main" val="735758273"/>
+      </p:ext>
+    </p:extLst>
+  </p:cSld>
+  <p:clrMapOvr>
+    <a:masterClrMapping/>
+  </p:clrMapOvr>
+</p:sld>
+</file>
+
+<file path=ppt/slides/slide13.xml><?xml version="1.0" encoding="utf-8"?>
+<p:sld xmlns:a="http://schemas.openxmlformats.org/drawingml/2006/main" xmlns:r="http://schemas.openxmlformats.org/officeDocument/2006/relationships" xmlns:p="http://schemas.openxmlformats.org/presentationml/2006/main">
+  <p:cSld>
+    <p:spTree>
+      <p:nvGrpSpPr>
+        <p:cNvPr id="1" name=""/>
+        <p:cNvGrpSpPr/>
+        <p:nvPr/>
+      </p:nvGrpSpPr>
+      <p:grpSpPr>
+        <a:xfrm>
+          <a:off x="0" y="0"/>
+          <a:ext cx="0" cy="0"/>
+          <a:chOff x="0" y="0"/>
+          <a:chExt cx="0" cy="0"/>
+        </a:xfrm>
+      </p:grpSpPr>
+      <p:sp>
+        <p:nvSpPr>
+          <p:cNvPr id="2" name="Title 1"/>
+          <p:cNvSpPr>
+            <a:spLocks noGrp="1"/>
+          </p:cNvSpPr>
+          <p:nvPr>
+            <p:ph type="title"/>
+          </p:nvPr>
+        </p:nvSpPr>
+        <p:spPr>
+          <a:xfrm>
+            <a:off x="677334" y="367004"/>
+            <a:ext cx="8596668" cy="622041"/>
+          </a:xfrm>
+        </p:spPr>
+        <p:txBody>
+          <a:bodyPr>
+            <a:normAutofit/>
+          </a:bodyPr>
+          <a:lstStyle/>
+          <a:p>
+            <a:r>
+              <a:rPr lang="en-US" sz="2800" dirty="0" smtClean="0"/>
+              <a:t>Step Builder </a:t>
+            </a:r>
+            <a:r>
+              <a:rPr lang="en-US" sz="2800" dirty="0" smtClean="0"/>
+              <a:t>design pattern</a:t>
+            </a:r>
+            <a:endParaRPr lang="en-US" sz="2800" dirty="0"/>
+          </a:p>
+        </p:txBody>
+      </p:sp>
+      <p:sp>
+        <p:nvSpPr>
+          <p:cNvPr id="3" name="Content Placeholder 2"/>
+          <p:cNvSpPr>
+            <a:spLocks noGrp="1"/>
+          </p:cNvSpPr>
+          <p:nvPr>
+            <p:ph idx="1"/>
+          </p:nvPr>
+        </p:nvSpPr>
+        <p:spPr>
+          <a:xfrm>
+            <a:off x="677334" y="989045"/>
+            <a:ext cx="8596668" cy="2799183"/>
+          </a:xfrm>
+        </p:spPr>
+        <p:txBody>
+          <a:bodyPr>
+            <a:normAutofit/>
+          </a:bodyPr>
+          <a:lstStyle/>
+          <a:p>
+            <a:r>
+              <a:rPr lang="en-US" sz="2000" dirty="0" smtClean="0"/>
+              <a:t>It’s</a:t>
+            </a:r>
+            <a:r>
+              <a:rPr lang="en-US" sz="2000" dirty="0" smtClean="0"/>
+              <a:t> </a:t>
+            </a:r>
+            <a:r>
+              <a:rPr lang="en-US" sz="2000" dirty="0"/>
+              <a:t>an extension of the builder pattern that fully guides the user through the creation of the object with no chances of confusion</a:t>
+            </a:r>
+            <a:r>
+              <a:rPr lang="en-US" sz="2000" dirty="0" smtClean="0"/>
+              <a:t>. </a:t>
+            </a:r>
+            <a:r>
+              <a:rPr lang="en-US" sz="2000" dirty="0"/>
+              <a:t>The intent of the Step Builder design pattern is to separate the construction of a complex object from its representation by creating defined steps and exposing to the user only selected methods per time.</a:t>
+            </a:r>
+            <a:endParaRPr lang="en-US" sz="2000" dirty="0"/>
+          </a:p>
+        </p:txBody>
+      </p:sp>
+    </p:spTree>
+    <p:extLst>
+      <p:ext uri="{BB962C8B-B14F-4D97-AF65-F5344CB8AC3E}">
+        <p14:creationId xmlns:p14="http://schemas.microsoft.com/office/powerpoint/2010/main" val="510179608"/>
       </p:ext>
     </p:extLst>
   </p:cSld>
@@ -7784,11 +7883,7 @@
           <a:p>
             <a:r>
               <a:rPr lang="en-US" sz="2800" dirty="0" smtClean="0"/>
-              <a:t>Abstract factory </a:t>
-            </a:r>
-            <a:r>
-              <a:rPr lang="en-US" sz="2800" dirty="0" smtClean="0"/>
-              <a:t>design pattern</a:t>
+              <a:t>Abstract factory design pattern</a:t>
             </a:r>
             <a:endParaRPr lang="en-US" sz="2800" dirty="0"/>
           </a:p>
@@ -7907,11 +8002,7 @@
           <a:p>
             <a:r>
               <a:rPr lang="en-US" sz="2800" dirty="0" smtClean="0"/>
-              <a:t>Singleton design </a:t>
-            </a:r>
-            <a:r>
-              <a:rPr lang="en-US" sz="2800" dirty="0" smtClean="0"/>
-              <a:t>pattern</a:t>
+              <a:t>Singleton design pattern</a:t>
             </a:r>
             <a:endParaRPr lang="en-US" sz="2800" dirty="0"/>
           </a:p>
@@ -8146,11 +8237,7 @@
           <a:p>
             <a:r>
               <a:rPr lang="en-US" sz="2800" dirty="0" smtClean="0"/>
-              <a:t>Singleton design </a:t>
-            </a:r>
-            <a:r>
-              <a:rPr lang="en-US" sz="2800" dirty="0" smtClean="0"/>
-              <a:t>pattern</a:t>
+              <a:t>Singleton design pattern</a:t>
             </a:r>
             <a:endParaRPr lang="en-US" sz="2800" dirty="0"/>
           </a:p>
@@ -8243,11 +8330,7 @@
           <a:p>
             <a:r>
               <a:rPr lang="en-US" sz="2800" dirty="0" smtClean="0"/>
-              <a:t>Singleton design </a:t>
-            </a:r>
-            <a:r>
-              <a:rPr lang="en-US" sz="2800" dirty="0" smtClean="0"/>
-              <a:t>pattern</a:t>
+              <a:t>Singleton design pattern</a:t>
             </a:r>
             <a:endParaRPr lang="en-US" sz="2800" dirty="0"/>
           </a:p>
@@ -8353,11 +8436,7 @@
           <a:p>
             <a:r>
               <a:rPr lang="en-US" sz="2800" dirty="0" smtClean="0"/>
-              <a:t>Singleton design </a:t>
-            </a:r>
-            <a:r>
-              <a:rPr lang="en-US" sz="2800" dirty="0" smtClean="0"/>
-              <a:t>pattern</a:t>
+              <a:t>Singleton design pattern</a:t>
             </a:r>
             <a:endParaRPr lang="en-US" sz="2800" dirty="0"/>
           </a:p>

</xml_diff>